<commit_message>
Added more images to the screen shot and updated the PPTX file
</commit_message>
<xml_diff>
--- a/Feb_2021_Kubernetes/Kubernetes.pptx
+++ b/Feb_2021_Kubernetes/Kubernetes.pptx
@@ -5,14 +5,16 @@
     <p:sldMasterId id="2147483648" r:id="rId1"/>
   </p:sldMasterIdLst>
   <p:notesMasterIdLst>
-    <p:notesMasterId r:id="rId7"/>
+    <p:notesMasterId r:id="rId9"/>
   </p:notesMasterIdLst>
   <p:sldIdLst>
     <p:sldId id="259" r:id="rId2"/>
     <p:sldId id="263" r:id="rId3"/>
-    <p:sldId id="269" r:id="rId4"/>
-    <p:sldId id="267" r:id="rId5"/>
-    <p:sldId id="268" r:id="rId6"/>
+    <p:sldId id="271" r:id="rId4"/>
+    <p:sldId id="269" r:id="rId5"/>
+    <p:sldId id="267" r:id="rId6"/>
+    <p:sldId id="270" r:id="rId7"/>
+    <p:sldId id="268" r:id="rId8"/>
   </p:sldIdLst>
   <p:sldSz cx="12192000" cy="6858000"/>
   <p:notesSz cx="6858000" cy="9144000"/>
@@ -201,7 +203,7 @@
           <a:p>
             <a:fld id="{3D489D7F-5E0A-4AB7-9046-90C75797668D}" type="datetimeFigureOut">
               <a:rPr lang="en-US" smtClean="0"/>
-              <a:t>2/11/2021</a:t>
+              <a:t>2/12/2021</a:t>
             </a:fld>
             <a:endParaRPr lang="en-US" dirty="0"/>
           </a:p>
@@ -723,7 +725,7 @@
           <a:p>
             <a:fld id="{48CDD979-1E21-459F-A323-FC7A349FE621}" type="slidenum">
               <a:rPr lang="en-US" smtClean="0"/>
-              <a:t>4</a:t>
+              <a:t>5</a:t>
             </a:fld>
             <a:endParaRPr lang="en-US" dirty="0"/>
           </a:p>
@@ -807,7 +809,7 @@
           <a:p>
             <a:fld id="{48CDD979-1E21-459F-A323-FC7A349FE621}" type="slidenum">
               <a:rPr lang="en-US" smtClean="0"/>
-              <a:t>5</a:t>
+              <a:t>7</a:t>
             </a:fld>
             <a:endParaRPr lang="en-US" dirty="0"/>
           </a:p>
@@ -1052,7 +1054,7 @@
           <a:p>
             <a:fld id="{4BDF68E2-58F2-4D09-BE8B-E3BD06533059}" type="datetimeFigureOut">
               <a:rPr lang="en-US" dirty="0"/>
-              <a:t>2/11/2021</a:t>
+              <a:t>2/12/2021</a:t>
             </a:fld>
             <a:endParaRPr lang="en-US" dirty="0"/>
           </a:p>
@@ -1255,7 +1257,7 @@
           <a:p>
             <a:fld id="{2E2D6473-DF6D-4702-B328-E0DD40540A4E}" type="datetimeFigureOut">
               <a:rPr lang="en-US" dirty="0"/>
-              <a:t>2/11/2021</a:t>
+              <a:t>2/12/2021</a:t>
             </a:fld>
             <a:endParaRPr lang="en-US" dirty="0"/>
           </a:p>
@@ -1506,7 +1508,7 @@
           <a:p>
             <a:fld id="{E26F7E3A-B166-407D-9866-32884E7D5B37}" type="datetimeFigureOut">
               <a:rPr lang="en-US" dirty="0"/>
-              <a:t>2/11/2021</a:t>
+              <a:t>2/12/2021</a:t>
             </a:fld>
             <a:endParaRPr lang="en-US" dirty="0"/>
           </a:p>
@@ -1774,7 +1776,7 @@
           <a:p>
             <a:fld id="{528FC5F6-F338-4AE4-BB23-26385BCFC423}" type="datetimeFigureOut">
               <a:rPr lang="en-US" dirty="0"/>
-              <a:t>2/11/2021</a:t>
+              <a:t>2/12/2021</a:t>
             </a:fld>
             <a:endParaRPr lang="en-US" dirty="0"/>
           </a:p>
@@ -2112,7 +2114,7 @@
           <a:p>
             <a:fld id="{20EBB0C4-6273-4C6E-B9BD-2EDC30F1CD52}" type="datetimeFigureOut">
               <a:rPr lang="en-US" dirty="0"/>
-              <a:t>2/11/2021</a:t>
+              <a:t>2/12/2021</a:t>
             </a:fld>
             <a:endParaRPr lang="en-US" dirty="0"/>
           </a:p>
@@ -2382,7 +2384,7 @@
           <a:p>
             <a:fld id="{19AB4D41-86C1-4908-B66A-0B50CEB3BF29}" type="datetimeFigureOut">
               <a:rPr lang="en-US" dirty="0"/>
-              <a:t>2/11/2021</a:t>
+              <a:t>2/12/2021</a:t>
             </a:fld>
             <a:endParaRPr lang="en-US" dirty="0"/>
           </a:p>
@@ -2756,7 +2758,7 @@
           <a:p>
             <a:fld id="{E6426E2C-56C1-4E0D-A793-0088A7FDD37E}" type="datetimeFigureOut">
               <a:rPr lang="en-US" dirty="0"/>
-              <a:t>2/11/2021</a:t>
+              <a:t>2/12/2021</a:t>
             </a:fld>
             <a:endParaRPr lang="en-US" dirty="0"/>
           </a:p>
@@ -2869,7 +2871,7 @@
           <a:p>
             <a:fld id="{C8C39B41-D8B5-4052-B551-9B5525EAA8B6}" type="datetimeFigureOut">
               <a:rPr lang="en-US" dirty="0"/>
-              <a:t>2/11/2021</a:t>
+              <a:t>2/12/2021</a:t>
             </a:fld>
             <a:endParaRPr lang="en-US" dirty="0"/>
           </a:p>
@@ -3035,7 +3037,7 @@
           <a:p>
             <a:fld id="{4D94136C-8742-45B2-AF27-D93DF72833A9}" type="datetimeFigureOut">
               <a:rPr lang="en-US" dirty="0"/>
-              <a:t>2/11/2021</a:t>
+              <a:t>2/12/2021</a:t>
             </a:fld>
             <a:endParaRPr lang="en-US" dirty="0"/>
           </a:p>
@@ -3385,7 +3387,7 @@
           <a:p>
             <a:fld id="{32ABBEA6-7C60-4B02-AE87-00D78D8422AF}" type="datetimeFigureOut">
               <a:rPr lang="en-US" dirty="0"/>
-              <a:t>2/11/2021</a:t>
+              <a:t>2/12/2021</a:t>
             </a:fld>
             <a:endParaRPr lang="en-US" dirty="0"/>
           </a:p>
@@ -3762,7 +3764,7 @@
           <a:p>
             <a:fld id="{C9CAD897-D46E-4AD2-BD9B-49DD3E640873}" type="datetimeFigureOut">
               <a:rPr lang="en-US" dirty="0"/>
-              <a:t>2/11/2021</a:t>
+              <a:t>2/12/2021</a:t>
             </a:fld>
             <a:endParaRPr lang="en-US" dirty="0"/>
           </a:p>
@@ -4044,7 +4046,7 @@
           <a:p>
             <a:fld id="{98624D31-43A5-475A-80CF-332C9F6DCF35}" type="datetimeFigureOut">
               <a:rPr lang="en-US" dirty="0"/>
-              <a:t>2/11/2021</a:t>
+              <a:t>2/12/2021</a:t>
             </a:fld>
             <a:endParaRPr lang="en-US" dirty="0"/>
           </a:p>
@@ -4651,7 +4653,10 @@
           <a:lstStyle/>
           <a:p>
             <a:pPr algn="ctr"/>
-            <a:endParaRPr lang="en-US" sz="900" dirty="0"/>
+            <a:r>
+              <a:rPr lang="en-US" sz="3600" b="1" dirty="0"/>
+              <a:t>Understanding Kubernetes</a:t>
+            </a:r>
           </a:p>
         </p:txBody>
       </p:sp>
@@ -4677,7 +4682,7 @@
         </p:blipFill>
         <p:spPr>
           <a:xfrm>
-            <a:off x="3418399" y="2535147"/>
+            <a:off x="3396407" y="823305"/>
             <a:ext cx="5377193" cy="893853"/>
           </a:xfrm>
           <a:prstGeom prst="rect">
@@ -4685,6 +4690,84 @@
           </a:prstGeom>
         </p:spPr>
       </p:pic>
+      <p:sp>
+        <p:nvSpPr>
+          <p:cNvPr id="2" name="TextBox 1">
+            <a:extLst>
+              <a:ext uri="{FF2B5EF4-FFF2-40B4-BE49-F238E27FC236}">
+                <a16:creationId xmlns:a16="http://schemas.microsoft.com/office/drawing/2014/main" id="{144FFDD7-41CE-4055-AB65-2719D6678683}"/>
+              </a:ext>
+            </a:extLst>
+          </p:cNvPr>
+          <p:cNvSpPr txBox="1"/>
+          <p:nvPr/>
+        </p:nvSpPr>
+        <p:spPr>
+          <a:xfrm>
+            <a:off x="9533706" y="5942770"/>
+            <a:ext cx="1183337" cy="400110"/>
+          </a:xfrm>
+          <a:prstGeom prst="rect">
+            <a:avLst/>
+          </a:prstGeom>
+          <a:noFill/>
+        </p:spPr>
+        <p:txBody>
+          <a:bodyPr wrap="none" rtlCol="0">
+            <a:spAutoFit/>
+          </a:bodyPr>
+          <a:lstStyle/>
+          <a:p>
+            <a:r>
+              <a:rPr lang="en-US" sz="2000" dirty="0">
+                <a:solidFill>
+                  <a:schemeClr val="lt1"/>
+                </a:solidFill>
+              </a:rPr>
+              <a:t>Amit Dhir</a:t>
+            </a:r>
+          </a:p>
+        </p:txBody>
+      </p:sp>
+      <p:sp>
+        <p:nvSpPr>
+          <p:cNvPr id="3" name="TextBox 2">
+            <a:extLst>
+              <a:ext uri="{FF2B5EF4-FFF2-40B4-BE49-F238E27FC236}">
+                <a16:creationId xmlns:a16="http://schemas.microsoft.com/office/drawing/2014/main" id="{11BFDE94-546A-449A-A892-0018C9B876D0}"/>
+              </a:ext>
+            </a:extLst>
+          </p:cNvPr>
+          <p:cNvSpPr txBox="1"/>
+          <p:nvPr/>
+        </p:nvSpPr>
+        <p:spPr>
+          <a:xfrm>
+            <a:off x="9533706" y="6284969"/>
+            <a:ext cx="2271071" cy="400110"/>
+          </a:xfrm>
+          <a:prstGeom prst="rect">
+            <a:avLst/>
+          </a:prstGeom>
+          <a:noFill/>
+        </p:spPr>
+        <p:txBody>
+          <a:bodyPr wrap="none" rtlCol="0">
+            <a:spAutoFit/>
+          </a:bodyPr>
+          <a:lstStyle/>
+          <a:p>
+            <a:r>
+              <a:rPr lang="en-US" sz="2000" dirty="0">
+                <a:solidFill>
+                  <a:schemeClr val="lt1"/>
+                </a:solidFill>
+              </a:rPr>
+              <a:t>Principal Consultant</a:t>
+            </a:r>
+          </a:p>
+        </p:txBody>
+      </p:sp>
     </p:spTree>
     <p:extLst>
       <p:ext uri="{BB962C8B-B14F-4D97-AF65-F5344CB8AC3E}">
@@ -4781,7 +4864,17 @@
             </a:pPr>
             <a:r>
               <a:rPr lang="en-US" dirty="0"/>
-              <a:t>Automatic deployment.</a:t>
+              <a:t>Automatic deployment, Scaling , Management of containerized application.</a:t>
+            </a:r>
+          </a:p>
+          <a:p>
+            <a:pPr marL="544068" lvl="1" indent="-342900">
+              <a:buFont typeface="+mj-lt"/>
+              <a:buAutoNum type="arabicPeriod"/>
+            </a:pPr>
+            <a:r>
+              <a:rPr lang="en-US" dirty="0"/>
+              <a:t>Walkthrough of a demo app and setting up of local environment.</a:t>
             </a:r>
           </a:p>
           <a:p>
@@ -4791,7 +4884,7 @@
             </a:pPr>
             <a:r>
               <a:rPr lang="en-US" dirty="0"/>
-              <a:t>Scaling.</a:t>
+              <a:t>Docker file and accessing docker image from the docker hub.</a:t>
             </a:r>
           </a:p>
           <a:p>
@@ -4801,7 +4894,7 @@
             </a:pPr>
             <a:r>
               <a:rPr lang="en-US" dirty="0"/>
-              <a:t>Management of containerized application.</a:t>
+              <a:t>Running a docker container on local machine also via Kubernetes.</a:t>
             </a:r>
           </a:p>
           <a:p>
@@ -4811,7 +4904,7 @@
             </a:pPr>
             <a:r>
               <a:rPr lang="en-US" dirty="0"/>
-              <a:t>Explanation of demo.</a:t>
+              <a:t>Kubernetes</a:t>
             </a:r>
           </a:p>
           <a:p>
@@ -4821,7 +4914,17 @@
             </a:pPr>
             <a:r>
               <a:rPr lang="en-US" dirty="0"/>
-              <a:t>Using socker image and accessing same via web browser.</a:t>
+              <a:t>Theory</a:t>
+            </a:r>
+          </a:p>
+          <a:p>
+            <a:pPr marL="909828" lvl="3" indent="-342900">
+              <a:buFont typeface="+mj-lt"/>
+              <a:buAutoNum type="arabicPeriod"/>
+            </a:pPr>
+            <a:r>
+              <a:rPr lang="en-US" dirty="0"/>
+              <a:t>Container, Pod, Services, Replica set, Deployments and Config maps.</a:t>
             </a:r>
           </a:p>
           <a:p>
@@ -4829,7 +4932,10 @@
               <a:buFont typeface="+mj-lt"/>
               <a:buAutoNum type="arabicPeriod"/>
             </a:pPr>
-            <a:endParaRPr lang="en-US" dirty="0"/>
+            <a:r>
+              <a:rPr lang="en-US" dirty="0"/>
+              <a:t>Demonstration of same using demo application using Declarative manner ( using manifest file ) .</a:t>
+            </a:r>
           </a:p>
           <a:p>
             <a:pPr marL="544068" lvl="1" indent="-342900">
@@ -4838,25 +4944,8 @@
             </a:pPr>
             <a:r>
               <a:rPr lang="en-US" dirty="0"/>
-              <a:t>Running a docker container on local machine.</a:t>
-            </a:r>
-          </a:p>
-          <a:p>
-            <a:pPr marL="544068" lvl="1" indent="-342900">
-              <a:buFont typeface="+mj-lt"/>
-              <a:buAutoNum type="arabicPeriod"/>
-            </a:pPr>
-            <a:r>
-              <a:rPr lang="en-US" dirty="0"/>
-              <a:t>How can we run same image via Kubernetes.</a:t>
-            </a:r>
-          </a:p>
-          <a:p>
-            <a:pPr marL="544068" lvl="1" indent="-342900">
-              <a:buFont typeface="+mj-lt"/>
-              <a:buAutoNum type="arabicPeriod"/>
-            </a:pPr>
-            <a:endParaRPr lang="en-US" dirty="0"/>
+              <a:t>QA Session</a:t>
+            </a:r>
           </a:p>
           <a:p>
             <a:pPr marL="544068" lvl="1" indent="-342900">
@@ -4895,6 +4984,137 @@
 </file>
 
 <file path=ppt/slides/slide3.xml><?xml version="1.0" encoding="utf-8"?>
+<p:sld xmlns:a="http://schemas.openxmlformats.org/drawingml/2006/main" xmlns:r="http://schemas.openxmlformats.org/officeDocument/2006/relationships" xmlns:p="http://schemas.openxmlformats.org/presentationml/2006/main">
+  <p:cSld>
+    <p:spTree>
+      <p:nvGrpSpPr>
+        <p:cNvPr id="1" name=""/>
+        <p:cNvGrpSpPr/>
+        <p:nvPr/>
+      </p:nvGrpSpPr>
+      <p:grpSpPr>
+        <a:xfrm>
+          <a:off x="0" y="0"/>
+          <a:ext cx="0" cy="0"/>
+          <a:chOff x="0" y="0"/>
+          <a:chExt cx="0" cy="0"/>
+        </a:xfrm>
+      </p:grpSpPr>
+      <p:pic>
+        <p:nvPicPr>
+          <p:cNvPr id="9" name="Graphic 8">
+            <a:extLst>
+              <a:ext uri="{FF2B5EF4-FFF2-40B4-BE49-F238E27FC236}">
+                <a16:creationId xmlns:a16="http://schemas.microsoft.com/office/drawing/2014/main" id="{EA2FE449-9218-4E3E-A6E5-13B1BC419A5F}"/>
+              </a:ext>
+            </a:extLst>
+          </p:cNvPr>
+          <p:cNvPicPr>
+            <a:picLocks noChangeAspect="1"/>
+          </p:cNvPicPr>
+          <p:nvPr/>
+        </p:nvPicPr>
+        <p:blipFill>
+          <a:blip r:embed="rId2">
+            <a:extLst>
+              <a:ext uri="{96DAC541-7B7A-43D3-8B79-37D633B846F1}">
+                <asvg:svgBlip xmlns:asvg="http://schemas.microsoft.com/office/drawing/2016/SVG/main" r:embed="rId3"/>
+              </a:ext>
+            </a:extLst>
+          </a:blip>
+          <a:stretch>
+            <a:fillRect/>
+          </a:stretch>
+        </p:blipFill>
+        <p:spPr>
+          <a:xfrm>
+            <a:off x="0" y="1671777"/>
+            <a:ext cx="12192000" cy="4492646"/>
+          </a:xfrm>
+          <a:prstGeom prst="rect">
+            <a:avLst/>
+          </a:prstGeom>
+        </p:spPr>
+      </p:pic>
+      <p:sp>
+        <p:nvSpPr>
+          <p:cNvPr id="10" name="Title 9">
+            <a:extLst>
+              <a:ext uri="{FF2B5EF4-FFF2-40B4-BE49-F238E27FC236}">
+                <a16:creationId xmlns:a16="http://schemas.microsoft.com/office/drawing/2014/main" id="{65969502-176A-4B3F-B08E-60E37E370B50}"/>
+              </a:ext>
+            </a:extLst>
+          </p:cNvPr>
+          <p:cNvSpPr>
+            <a:spLocks noGrp="1"/>
+          </p:cNvSpPr>
+          <p:nvPr>
+            <p:ph type="title"/>
+          </p:nvPr>
+        </p:nvSpPr>
+        <p:spPr>
+          <a:xfrm>
+            <a:off x="1097280" y="627994"/>
+            <a:ext cx="10058400" cy="1043783"/>
+          </a:xfrm>
+        </p:spPr>
+        <p:txBody>
+          <a:bodyPr/>
+          <a:lstStyle/>
+          <a:p>
+            <a:r>
+              <a:rPr lang="en-US" b="0" i="0" dirty="0">
+                <a:solidFill>
+                  <a:srgbClr val="222222"/>
+                </a:solidFill>
+                <a:effectLst/>
+                <a:latin typeface="open sans"/>
+              </a:rPr>
+              <a:t>Going back in time</a:t>
+            </a:r>
+            <a:endParaRPr lang="en-US" dirty="0"/>
+          </a:p>
+        </p:txBody>
+      </p:sp>
+      <p:sp>
+        <p:nvSpPr>
+          <p:cNvPr id="11" name="Content Placeholder 10">
+            <a:extLst>
+              <a:ext uri="{FF2B5EF4-FFF2-40B4-BE49-F238E27FC236}">
+                <a16:creationId xmlns:a16="http://schemas.microsoft.com/office/drawing/2014/main" id="{E5C23279-27CD-4A1E-AD51-4EE33D0D1910}"/>
+              </a:ext>
+            </a:extLst>
+          </p:cNvPr>
+          <p:cNvSpPr>
+            <a:spLocks noGrp="1"/>
+          </p:cNvSpPr>
+          <p:nvPr>
+            <p:ph idx="1"/>
+          </p:nvPr>
+        </p:nvSpPr>
+        <p:spPr/>
+        <p:txBody>
+          <a:bodyPr/>
+          <a:lstStyle/>
+          <a:p>
+            <a:endParaRPr lang="en-US" dirty="0"/>
+          </a:p>
+        </p:txBody>
+      </p:sp>
+    </p:spTree>
+    <p:extLst>
+      <p:ext uri="{BB962C8B-B14F-4D97-AF65-F5344CB8AC3E}">
+        <p14:creationId xmlns:p14="http://schemas.microsoft.com/office/powerpoint/2010/main" val="426370487"/>
+      </p:ext>
+    </p:extLst>
+  </p:cSld>
+  <p:clrMapOvr>
+    <a:masterClrMapping/>
+  </p:clrMapOvr>
+</p:sld>
+</file>
+
+<file path=ppt/slides/slide4.xml><?xml version="1.0" encoding="utf-8"?>
 <p:sld xmlns:a="http://schemas.openxmlformats.org/drawingml/2006/main" xmlns:r="http://schemas.openxmlformats.org/officeDocument/2006/relationships" xmlns:p="http://schemas.openxmlformats.org/presentationml/2006/main">
   <p:cSld>
     <p:spTree>
@@ -4954,7 +5174,7 @@
 </p:sld>
 </file>
 
-<file path=ppt/slides/slide4.xml><?xml version="1.0" encoding="utf-8"?>
+<file path=ppt/slides/slide5.xml><?xml version="1.0" encoding="utf-8"?>
 <p:sld xmlns:a="http://schemas.openxmlformats.org/drawingml/2006/main" xmlns:r="http://schemas.openxmlformats.org/officeDocument/2006/relationships" xmlns:p="http://schemas.openxmlformats.org/presentationml/2006/main">
   <p:cSld>
     <p:spTree>
@@ -4985,8 +5205,8 @@
         </p:nvSpPr>
         <p:spPr>
           <a:xfrm>
-            <a:off x="5149811" y="3044279"/>
-            <a:ext cx="2030695" cy="769441"/>
+            <a:off x="4625217" y="2659559"/>
+            <a:ext cx="2941566" cy="769441"/>
           </a:xfrm>
           <a:prstGeom prst="rect">
             <a:avLst/>
@@ -4998,9 +5218,10 @@
           </a:bodyPr>
           <a:lstStyle/>
           <a:p>
+            <a:pPr algn="ctr"/>
             <a:r>
               <a:rPr lang="en-US" sz="4400" dirty="0"/>
-              <a:t>DEMO</a:t>
+              <a:t>DEMO APP</a:t>
             </a:r>
           </a:p>
         </p:txBody>
@@ -5018,7 +5239,194 @@
 </p:sld>
 </file>
 
-<file path=ppt/slides/slide5.xml><?xml version="1.0" encoding="utf-8"?>
+<file path=ppt/slides/slide6.xml><?xml version="1.0" encoding="utf-8"?>
+<p:sld xmlns:a="http://schemas.openxmlformats.org/drawingml/2006/main" xmlns:r="http://schemas.openxmlformats.org/officeDocument/2006/relationships" xmlns:p="http://schemas.openxmlformats.org/presentationml/2006/main">
+  <p:cSld>
+    <p:spTree>
+      <p:nvGrpSpPr>
+        <p:cNvPr id="1" name=""/>
+        <p:cNvGrpSpPr/>
+        <p:nvPr/>
+      </p:nvGrpSpPr>
+      <p:grpSpPr>
+        <a:xfrm>
+          <a:off x="0" y="0"/>
+          <a:ext cx="0" cy="0"/>
+          <a:chOff x="0" y="0"/>
+          <a:chExt cx="0" cy="0"/>
+        </a:xfrm>
+      </p:grpSpPr>
+      <p:sp>
+        <p:nvSpPr>
+          <p:cNvPr id="2" name="Title 1">
+            <a:extLst>
+              <a:ext uri="{FF2B5EF4-FFF2-40B4-BE49-F238E27FC236}">
+                <a16:creationId xmlns:a16="http://schemas.microsoft.com/office/drawing/2014/main" id="{AE6FC849-36EB-4DEA-848F-12EC945EA22C}"/>
+              </a:ext>
+            </a:extLst>
+          </p:cNvPr>
+          <p:cNvSpPr>
+            <a:spLocks noGrp="1"/>
+          </p:cNvSpPr>
+          <p:nvPr>
+            <p:ph type="title"/>
+          </p:nvPr>
+        </p:nvSpPr>
+        <p:spPr/>
+        <p:txBody>
+          <a:bodyPr/>
+          <a:lstStyle/>
+          <a:p>
+            <a:r>
+              <a:rPr lang="en-US" dirty="0"/>
+              <a:t>Important URL and references</a:t>
+            </a:r>
+          </a:p>
+        </p:txBody>
+      </p:sp>
+      <p:sp>
+        <p:nvSpPr>
+          <p:cNvPr id="3" name="Content Placeholder 2">
+            <a:extLst>
+              <a:ext uri="{FF2B5EF4-FFF2-40B4-BE49-F238E27FC236}">
+                <a16:creationId xmlns:a16="http://schemas.microsoft.com/office/drawing/2014/main" id="{BA81FB4F-A096-468A-9BE8-77D404D4D3E9}"/>
+              </a:ext>
+            </a:extLst>
+          </p:cNvPr>
+          <p:cNvSpPr>
+            <a:spLocks noGrp="1"/>
+          </p:cNvSpPr>
+          <p:nvPr>
+            <p:ph idx="1"/>
+          </p:nvPr>
+        </p:nvSpPr>
+        <p:spPr/>
+        <p:txBody>
+          <a:bodyPr>
+            <a:normAutofit fontScale="85000" lnSpcReduction="20000"/>
+          </a:bodyPr>
+          <a:lstStyle/>
+          <a:p>
+            <a:r>
+              <a:rPr lang="en-US" dirty="0"/>
+              <a:t>Plural Sight course</a:t>
+            </a:r>
+          </a:p>
+          <a:p>
+            <a:r>
+              <a:rPr lang="en-US" dirty="0">
+                <a:hlinkClick r:id="rId2"/>
+              </a:rPr>
+              <a:t>https://app.pluralsight.com/library/courses/kubernetes-getting-started/table-of-contents</a:t>
+            </a:r>
+            <a:r>
+              <a:rPr lang="en-US" dirty="0"/>
+              <a:t> </a:t>
+            </a:r>
+          </a:p>
+          <a:p>
+            <a:r>
+              <a:rPr lang="en-US" dirty="0">
+                <a:hlinkClick r:id="rId3"/>
+              </a:rPr>
+              <a:t>https://app.pluralsight.com/library/courses/docker-kubernetes-big-picture/table-of-contents</a:t>
+            </a:r>
+            <a:r>
+              <a:rPr lang="en-US" dirty="0"/>
+              <a:t> </a:t>
+            </a:r>
+            <a:br>
+              <a:rPr lang="en-US" dirty="0"/>
+            </a:br>
+            <a:endParaRPr lang="en-US" dirty="0"/>
+          </a:p>
+          <a:p>
+            <a:r>
+              <a:rPr lang="en-US" dirty="0"/>
+              <a:t>Kubernetes Manifest ( Declarative )</a:t>
+            </a:r>
+            <a:br>
+              <a:rPr lang="en-US" dirty="0"/>
+            </a:br>
+            <a:br>
+              <a:rPr lang="en-US" dirty="0"/>
+            </a:br>
+            <a:r>
+              <a:rPr lang="en-US" dirty="0">
+                <a:hlinkClick r:id="rId4"/>
+              </a:rPr>
+              <a:t>https://kubernetes.io/docs/concepts/overview/what-is-kubernetes/</a:t>
+            </a:r>
+            <a:br>
+              <a:rPr lang="en-US" dirty="0"/>
+            </a:br>
+            <a:br>
+              <a:rPr lang="en-US" dirty="0"/>
+            </a:br>
+            <a:r>
+              <a:rPr lang="en-US" dirty="0">
+                <a:hlinkClick r:id="rId5"/>
+              </a:rPr>
+              <a:t>https://kubernetes.io/docs/concepts/overview/</a:t>
+            </a:r>
+            <a:br>
+              <a:rPr lang="en-US" dirty="0"/>
+            </a:br>
+            <a:br>
+              <a:rPr lang="en-US" dirty="0"/>
+            </a:br>
+            <a:r>
+              <a:rPr lang="en-US" dirty="0"/>
+              <a:t>Docker Hub</a:t>
+            </a:r>
+          </a:p>
+          <a:p>
+            <a:r>
+              <a:rPr lang="en-US" dirty="0">
+                <a:hlinkClick r:id="rId6"/>
+              </a:rPr>
+              <a:t>https://hub.docker.com/</a:t>
+            </a:r>
+            <a:br>
+              <a:rPr lang="en-US" dirty="0"/>
+            </a:br>
+            <a:br>
+              <a:rPr lang="en-US" dirty="0"/>
+            </a:br>
+            <a:r>
+              <a:rPr lang="en-US" dirty="0"/>
+              <a:t>Github</a:t>
+            </a:r>
+            <a:br>
+              <a:rPr lang="en-US" dirty="0"/>
+            </a:br>
+            <a:br>
+              <a:rPr lang="en-US" dirty="0"/>
+            </a:br>
+            <a:r>
+              <a:rPr lang="en-US" dirty="0">
+                <a:hlinkClick r:id="rId7"/>
+              </a:rPr>
+              <a:t>https://github.com/talktoamitdhir/kube</a:t>
+            </a:r>
+            <a:endParaRPr lang="en-US" dirty="0"/>
+          </a:p>
+        </p:txBody>
+      </p:sp>
+    </p:spTree>
+    <p:extLst>
+      <p:ext uri="{BB962C8B-B14F-4D97-AF65-F5344CB8AC3E}">
+        <p14:creationId xmlns:p14="http://schemas.microsoft.com/office/powerpoint/2010/main" val="4132265241"/>
+      </p:ext>
+    </p:extLst>
+  </p:cSld>
+  <p:clrMapOvr>
+    <a:masterClrMapping/>
+  </p:clrMapOvr>
+</p:sld>
+</file>
+
+<file path=ppt/slides/slide7.xml><?xml version="1.0" encoding="utf-8"?>
 <p:sld xmlns:a="http://schemas.openxmlformats.org/drawingml/2006/main" xmlns:r="http://schemas.openxmlformats.org/officeDocument/2006/relationships" xmlns:p="http://schemas.openxmlformats.org/presentationml/2006/main">
   <p:cSld>
     <p:spTree>

</xml_diff>